<commit_message>
improove project after evaluation 1
</commit_message>
<xml_diff>
--- a/P4/ud120-projects/final_project/notebook/pictures/diagrams.pptx
+++ b/P4/ud120-projects/final_project/notebook/pictures/diagrams.pptx
@@ -289,7 +289,7 @@
           <a:p>
             <a:fld id="{E9CB95CA-10B5-0446-B610-D5BC82EC236C}" type="datetimeFigureOut">
               <a:rPr lang="en-US" smtClean="0"/>
-              <a:t>27/05/15</a:t>
+              <a:t>01/06/15</a:t>
             </a:fld>
             <a:endParaRPr lang="en-US"/>
           </a:p>
@@ -459,7 +459,7 @@
           <a:p>
             <a:fld id="{E9CB95CA-10B5-0446-B610-D5BC82EC236C}" type="datetimeFigureOut">
               <a:rPr lang="en-US" smtClean="0"/>
-              <a:t>27/05/15</a:t>
+              <a:t>01/06/15</a:t>
             </a:fld>
             <a:endParaRPr lang="en-US"/>
           </a:p>
@@ -639,7 +639,7 @@
           <a:p>
             <a:fld id="{E9CB95CA-10B5-0446-B610-D5BC82EC236C}" type="datetimeFigureOut">
               <a:rPr lang="en-US" smtClean="0"/>
-              <a:t>27/05/15</a:t>
+              <a:t>01/06/15</a:t>
             </a:fld>
             <a:endParaRPr lang="en-US"/>
           </a:p>
@@ -809,7 +809,7 @@
           <a:p>
             <a:fld id="{E9CB95CA-10B5-0446-B610-D5BC82EC236C}" type="datetimeFigureOut">
               <a:rPr lang="en-US" smtClean="0"/>
-              <a:t>27/05/15</a:t>
+              <a:t>01/06/15</a:t>
             </a:fld>
             <a:endParaRPr lang="en-US"/>
           </a:p>
@@ -1055,7 +1055,7 @@
           <a:p>
             <a:fld id="{E9CB95CA-10B5-0446-B610-D5BC82EC236C}" type="datetimeFigureOut">
               <a:rPr lang="en-US" smtClean="0"/>
-              <a:t>27/05/15</a:t>
+              <a:t>01/06/15</a:t>
             </a:fld>
             <a:endParaRPr lang="en-US"/>
           </a:p>
@@ -1343,7 +1343,7 @@
           <a:p>
             <a:fld id="{E9CB95CA-10B5-0446-B610-D5BC82EC236C}" type="datetimeFigureOut">
               <a:rPr lang="en-US" smtClean="0"/>
-              <a:t>27/05/15</a:t>
+              <a:t>01/06/15</a:t>
             </a:fld>
             <a:endParaRPr lang="en-US"/>
           </a:p>
@@ -1765,7 +1765,7 @@
           <a:p>
             <a:fld id="{E9CB95CA-10B5-0446-B610-D5BC82EC236C}" type="datetimeFigureOut">
               <a:rPr lang="en-US" smtClean="0"/>
-              <a:t>27/05/15</a:t>
+              <a:t>01/06/15</a:t>
             </a:fld>
             <a:endParaRPr lang="en-US"/>
           </a:p>
@@ -1883,7 +1883,7 @@
           <a:p>
             <a:fld id="{E9CB95CA-10B5-0446-B610-D5BC82EC236C}" type="datetimeFigureOut">
               <a:rPr lang="en-US" smtClean="0"/>
-              <a:t>27/05/15</a:t>
+              <a:t>01/06/15</a:t>
             </a:fld>
             <a:endParaRPr lang="en-US"/>
           </a:p>
@@ -1978,7 +1978,7 @@
           <a:p>
             <a:fld id="{E9CB95CA-10B5-0446-B610-D5BC82EC236C}" type="datetimeFigureOut">
               <a:rPr lang="en-US" smtClean="0"/>
-              <a:t>27/05/15</a:t>
+              <a:t>01/06/15</a:t>
             </a:fld>
             <a:endParaRPr lang="en-US"/>
           </a:p>
@@ -2255,7 +2255,7 @@
           <a:p>
             <a:fld id="{E9CB95CA-10B5-0446-B610-D5BC82EC236C}" type="datetimeFigureOut">
               <a:rPr lang="en-US" smtClean="0"/>
-              <a:t>27/05/15</a:t>
+              <a:t>01/06/15</a:t>
             </a:fld>
             <a:endParaRPr lang="en-US"/>
           </a:p>
@@ -2508,7 +2508,7 @@
           <a:p>
             <a:fld id="{E9CB95CA-10B5-0446-B610-D5BC82EC236C}" type="datetimeFigureOut">
               <a:rPr lang="en-US" smtClean="0"/>
-              <a:t>27/05/15</a:t>
+              <a:t>01/06/15</a:t>
             </a:fld>
             <a:endParaRPr lang="en-US"/>
           </a:p>
@@ -2721,7 +2721,7 @@
           <a:p>
             <a:fld id="{E9CB95CA-10B5-0446-B610-D5BC82EC236C}" type="datetimeFigureOut">
               <a:rPr lang="en-US" smtClean="0"/>
-              <a:t>27/05/15</a:t>
+              <a:t>01/06/15</a:t>
             </a:fld>
             <a:endParaRPr lang="en-US"/>
           </a:p>
@@ -3098,13 +3098,78 @@
       </p:grpSpPr>
       <p:sp>
         <p:nvSpPr>
+          <p:cNvPr id="28" name="Rectangle 27"/>
+          <p:cNvSpPr/>
+          <p:nvPr/>
+        </p:nvSpPr>
+        <p:spPr>
+          <a:xfrm>
+            <a:off x="2457573" y="4376547"/>
+            <a:ext cx="2656027" cy="1609316"/>
+          </a:xfrm>
+          <a:prstGeom prst="rect">
+            <a:avLst/>
+          </a:prstGeom>
+        </p:spPr>
+        <p:style>
+          <a:lnRef idx="1">
+            <a:schemeClr val="accent1"/>
+          </a:lnRef>
+          <a:fillRef idx="3">
+            <a:schemeClr val="accent1"/>
+          </a:fillRef>
+          <a:effectRef idx="2">
+            <a:schemeClr val="accent1"/>
+          </a:effectRef>
+          <a:fontRef idx="minor">
+            <a:schemeClr val="lt1"/>
+          </a:fontRef>
+        </p:style>
+        <p:txBody>
+          <a:bodyPr rtlCol="0" anchor="ctr"/>
+          <a:lstStyle/>
+          <a:p>
+            <a:pPr algn="ctr"/>
+            <a:r>
+              <a:rPr lang="en-US" sz="1400" dirty="0" smtClean="0"/>
+              <a:t>Prune features</a:t>
+            </a:r>
+          </a:p>
+          <a:p>
+            <a:pPr algn="ctr"/>
+            <a:endParaRPr lang="en-US" sz="1400" dirty="0"/>
+          </a:p>
+          <a:p>
+            <a:pPr algn="ctr"/>
+            <a:endParaRPr lang="en-US" sz="1400" dirty="0" smtClean="0"/>
+          </a:p>
+          <a:p>
+            <a:pPr algn="ctr"/>
+            <a:endParaRPr lang="en-US" sz="1400" dirty="0"/>
+          </a:p>
+          <a:p>
+            <a:pPr algn="ctr"/>
+            <a:endParaRPr lang="en-US" sz="1400" dirty="0" smtClean="0"/>
+          </a:p>
+          <a:p>
+            <a:pPr algn="ctr"/>
+            <a:endParaRPr lang="en-US" sz="1400" dirty="0"/>
+          </a:p>
+          <a:p>
+            <a:pPr algn="ctr"/>
+            <a:endParaRPr lang="en-US" sz="1400" dirty="0"/>
+          </a:p>
+        </p:txBody>
+      </p:sp>
+      <p:sp>
+        <p:nvSpPr>
           <p:cNvPr id="4" name="Rectangle 3"/>
           <p:cNvSpPr/>
           <p:nvPr/>
         </p:nvSpPr>
         <p:spPr>
           <a:xfrm>
-            <a:off x="395536" y="548680"/>
+            <a:off x="395536" y="272030"/>
             <a:ext cx="1408220" cy="905388"/>
           </a:xfrm>
           <a:prstGeom prst="rect">
@@ -3149,7 +3214,7 @@
         </p:nvSpPr>
         <p:spPr>
           <a:xfrm>
-            <a:off x="2356986" y="759152"/>
+            <a:off x="2356986" y="482502"/>
             <a:ext cx="5387525" cy="369332"/>
           </a:xfrm>
           <a:prstGeom prst="rect">
@@ -3179,7 +3244,7 @@
         </p:nvSpPr>
         <p:spPr>
           <a:xfrm>
-            <a:off x="395536" y="2222636"/>
+            <a:off x="332671" y="1845386"/>
             <a:ext cx="1408220" cy="905388"/>
           </a:xfrm>
           <a:prstGeom prst="rect">
@@ -3227,7 +3292,7 @@
         </p:nvSpPr>
         <p:spPr>
           <a:xfrm>
-            <a:off x="2520438" y="2222636"/>
+            <a:off x="2457573" y="1136579"/>
             <a:ext cx="1408220" cy="905388"/>
           </a:xfrm>
           <a:prstGeom prst="rect">
@@ -3269,7 +3334,7 @@
         </p:nvSpPr>
         <p:spPr>
           <a:xfrm>
-            <a:off x="4698987" y="2222636"/>
+            <a:off x="4636122" y="1136579"/>
             <a:ext cx="1408220" cy="905388"/>
           </a:xfrm>
           <a:prstGeom prst="rect">
@@ -3311,7 +3376,7 @@
         </p:nvSpPr>
         <p:spPr>
           <a:xfrm>
-            <a:off x="6811317" y="2222636"/>
+            <a:off x="6828778" y="1177418"/>
             <a:ext cx="1408220" cy="905388"/>
           </a:xfrm>
           <a:prstGeom prst="rect">
@@ -3353,7 +3418,7 @@
         </p:nvSpPr>
         <p:spPr>
           <a:xfrm>
-            <a:off x="6811317" y="3858865"/>
+            <a:off x="6828778" y="2812145"/>
             <a:ext cx="1408220" cy="905388"/>
           </a:xfrm>
           <a:prstGeom prst="rect">
@@ -3395,7 +3460,7 @@
         </p:nvSpPr>
         <p:spPr>
           <a:xfrm>
-            <a:off x="4732095" y="3858865"/>
+            <a:off x="4636122" y="2812145"/>
             <a:ext cx="1408220" cy="905388"/>
           </a:xfrm>
           <a:prstGeom prst="rect">
@@ -3437,8 +3502,8 @@
         </p:nvSpPr>
         <p:spPr>
           <a:xfrm>
-            <a:off x="3325673" y="5582474"/>
-            <a:ext cx="4270080" cy="630243"/>
+            <a:off x="5884347" y="4866482"/>
+            <a:ext cx="2352649" cy="980574"/>
           </a:xfrm>
           <a:prstGeom prst="rect">
             <a:avLst/>
@@ -3485,7 +3550,7 @@
         </p:nvSpPr>
         <p:spPr>
           <a:xfrm rot="5400000">
-            <a:off x="799402" y="1744819"/>
+            <a:off x="799402" y="1380144"/>
             <a:ext cx="477789" cy="251496"/>
           </a:xfrm>
           <a:prstGeom prst="rightArrow">
@@ -3522,8 +3587,8 @@
           <p:nvPr/>
         </p:nvSpPr>
         <p:spPr>
-          <a:xfrm>
-            <a:off x="1879197" y="2548079"/>
+          <a:xfrm rot="19261174">
+            <a:off x="1816331" y="1867069"/>
             <a:ext cx="477789" cy="251496"/>
           </a:xfrm>
           <a:prstGeom prst="rightArrow">
@@ -3561,7 +3626,7 @@
         </p:nvSpPr>
         <p:spPr>
           <a:xfrm>
-            <a:off x="4049782" y="2548079"/>
+            <a:off x="3986917" y="1493291"/>
             <a:ext cx="477789" cy="251496"/>
           </a:xfrm>
           <a:prstGeom prst="rightArrow">
@@ -3599,7 +3664,7 @@
         </p:nvSpPr>
         <p:spPr>
           <a:xfrm rot="10800000">
-            <a:off x="6243686" y="4170233"/>
+            <a:off x="6180821" y="3154669"/>
             <a:ext cx="477789" cy="251496"/>
           </a:xfrm>
           <a:prstGeom prst="rightArrow">
@@ -3637,8 +3702,8 @@
         </p:nvSpPr>
         <p:spPr>
           <a:xfrm rot="5400000">
-            <a:off x="7231110" y="3392097"/>
-            <a:ext cx="477789" cy="251496"/>
+            <a:off x="7342721" y="2305266"/>
+            <a:ext cx="380334" cy="251496"/>
           </a:xfrm>
           <a:prstGeom prst="rightArrow">
             <a:avLst/>
@@ -3675,7 +3740,7 @@
         </p:nvSpPr>
         <p:spPr>
           <a:xfrm>
-            <a:off x="6243686" y="2548079"/>
+            <a:off x="6180821" y="1493291"/>
             <a:ext cx="477789" cy="251496"/>
           </a:xfrm>
           <a:prstGeom prst="rightArrow">
@@ -3707,13 +3772,215 @@
       </p:sp>
       <p:sp>
         <p:nvSpPr>
-          <p:cNvPr id="21" name="Right Arrow 20"/>
+          <p:cNvPr id="23" name="Rectangle 22"/>
           <p:cNvSpPr/>
           <p:nvPr/>
         </p:nvSpPr>
         <p:spPr>
+          <a:xfrm>
+            <a:off x="2457573" y="2812145"/>
+            <a:ext cx="1408220" cy="905388"/>
+          </a:xfrm>
+          <a:prstGeom prst="rect">
+            <a:avLst/>
+          </a:prstGeom>
+        </p:spPr>
+        <p:style>
+          <a:lnRef idx="1">
+            <a:schemeClr val="accent1"/>
+          </a:lnRef>
+          <a:fillRef idx="3">
+            <a:schemeClr val="accent1"/>
+          </a:fillRef>
+          <a:effectRef idx="2">
+            <a:schemeClr val="accent1"/>
+          </a:effectRef>
+          <a:fontRef idx="minor">
+            <a:schemeClr val="lt1"/>
+          </a:fontRef>
+        </p:style>
+        <p:txBody>
+          <a:bodyPr rtlCol="0" anchor="ctr"/>
+          <a:lstStyle/>
+          <a:p>
+            <a:pPr algn="ctr"/>
+            <a:r>
+              <a:rPr lang="en-US" sz="1400" dirty="0" smtClean="0"/>
+              <a:t>Standardize the data</a:t>
+            </a:r>
+            <a:endParaRPr lang="en-US" sz="1400" dirty="0"/>
+          </a:p>
+        </p:txBody>
+      </p:sp>
+      <p:sp>
+        <p:nvSpPr>
+          <p:cNvPr id="24" name="Rectangle 23"/>
+          <p:cNvSpPr/>
+          <p:nvPr/>
+        </p:nvSpPr>
+        <p:spPr>
+          <a:xfrm>
+            <a:off x="2545584" y="4778700"/>
+            <a:ext cx="2450660" cy="402505"/>
+          </a:xfrm>
+          <a:prstGeom prst="rect">
+            <a:avLst/>
+          </a:prstGeom>
+        </p:spPr>
+        <p:style>
+          <a:lnRef idx="1">
+            <a:schemeClr val="accent1"/>
+          </a:lnRef>
+          <a:fillRef idx="3">
+            <a:schemeClr val="accent1"/>
+          </a:fillRef>
+          <a:effectRef idx="2">
+            <a:schemeClr val="accent1"/>
+          </a:effectRef>
+          <a:fontRef idx="minor">
+            <a:schemeClr val="lt1"/>
+          </a:fontRef>
+        </p:style>
+        <p:txBody>
+          <a:bodyPr rtlCol="0" anchor="ctr"/>
+          <a:lstStyle/>
+          <a:p>
+            <a:pPr algn="ctr"/>
+            <a:r>
+              <a:rPr lang="en-US" sz="1400" dirty="0" smtClean="0"/>
+              <a:t>SelectKBest</a:t>
+            </a:r>
+            <a:endParaRPr lang="en-US" sz="1400" dirty="0"/>
+          </a:p>
+        </p:txBody>
+      </p:sp>
+      <p:sp>
+        <p:nvSpPr>
+          <p:cNvPr id="25" name="Right Arrow 24"/>
+          <p:cNvSpPr/>
+          <p:nvPr/>
+        </p:nvSpPr>
+        <p:spPr>
           <a:xfrm rot="5400000">
-            <a:off x="5201614" y="5051971"/>
+            <a:off x="2901967" y="3940084"/>
+            <a:ext cx="477789" cy="251496"/>
+          </a:xfrm>
+          <a:prstGeom prst="rightArrow">
+            <a:avLst/>
+          </a:prstGeom>
+        </p:spPr>
+        <p:style>
+          <a:lnRef idx="1">
+            <a:schemeClr val="accent1"/>
+          </a:lnRef>
+          <a:fillRef idx="3">
+            <a:schemeClr val="accent1"/>
+          </a:fillRef>
+          <a:effectRef idx="2">
+            <a:schemeClr val="accent1"/>
+          </a:effectRef>
+          <a:fontRef idx="minor">
+            <a:schemeClr val="lt1"/>
+          </a:fontRef>
+        </p:style>
+        <p:txBody>
+          <a:bodyPr rtlCol="0" anchor="ctr"/>
+          <a:lstStyle/>
+          <a:p>
+            <a:pPr algn="ctr"/>
+            <a:endParaRPr lang="en-US"/>
+          </a:p>
+        </p:txBody>
+      </p:sp>
+      <p:sp>
+        <p:nvSpPr>
+          <p:cNvPr id="26" name="Rectangle 25"/>
+          <p:cNvSpPr/>
+          <p:nvPr/>
+        </p:nvSpPr>
+        <p:spPr>
+          <a:xfrm>
+            <a:off x="2545584" y="5356769"/>
+            <a:ext cx="2450660" cy="402505"/>
+          </a:xfrm>
+          <a:prstGeom prst="rect">
+            <a:avLst/>
+          </a:prstGeom>
+        </p:spPr>
+        <p:style>
+          <a:lnRef idx="1">
+            <a:schemeClr val="accent1"/>
+          </a:lnRef>
+          <a:fillRef idx="3">
+            <a:schemeClr val="accent1"/>
+          </a:fillRef>
+          <a:effectRef idx="2">
+            <a:schemeClr val="accent1"/>
+          </a:effectRef>
+          <a:fontRef idx="minor">
+            <a:schemeClr val="lt1"/>
+          </a:fontRef>
+        </p:style>
+        <p:txBody>
+          <a:bodyPr rtlCol="0" anchor="ctr"/>
+          <a:lstStyle/>
+          <a:p>
+            <a:pPr algn="ctr"/>
+            <a:r>
+              <a:rPr lang="en-US" sz="1400" dirty="0" smtClean="0"/>
+              <a:t>PCA</a:t>
+            </a:r>
+            <a:endParaRPr lang="en-US" sz="1400" dirty="0"/>
+          </a:p>
+        </p:txBody>
+      </p:sp>
+      <p:sp>
+        <p:nvSpPr>
+          <p:cNvPr id="27" name="Right Arrow 26"/>
+          <p:cNvSpPr/>
+          <p:nvPr/>
+        </p:nvSpPr>
+        <p:spPr>
+          <a:xfrm>
+            <a:off x="5255678" y="5181205"/>
+            <a:ext cx="477789" cy="251496"/>
+          </a:xfrm>
+          <a:prstGeom prst="rightArrow">
+            <a:avLst/>
+          </a:prstGeom>
+        </p:spPr>
+        <p:style>
+          <a:lnRef idx="1">
+            <a:schemeClr val="accent1"/>
+          </a:lnRef>
+          <a:fillRef idx="3">
+            <a:schemeClr val="accent1"/>
+          </a:fillRef>
+          <a:effectRef idx="2">
+            <a:schemeClr val="accent1"/>
+          </a:effectRef>
+          <a:fontRef idx="minor">
+            <a:schemeClr val="lt1"/>
+          </a:fontRef>
+        </p:style>
+        <p:txBody>
+          <a:bodyPr rtlCol="0" anchor="ctr"/>
+          <a:lstStyle/>
+          <a:p>
+            <a:pPr algn="ctr"/>
+            <a:endParaRPr lang="en-US"/>
+          </a:p>
+        </p:txBody>
+      </p:sp>
+      <p:sp>
+        <p:nvSpPr>
+          <p:cNvPr id="29" name="Right Arrow 28"/>
+          <p:cNvSpPr/>
+          <p:nvPr/>
+        </p:nvSpPr>
+        <p:spPr>
+          <a:xfrm rot="10800000">
+            <a:off x="3986917" y="3102755"/>
             <a:ext cx="477789" cy="251496"/>
           </a:xfrm>
           <a:prstGeom prst="rightArrow">
@@ -3808,7 +4075,7 @@
           <a:p>
             <a:pPr algn="ctr"/>
             <a:r>
-              <a:rPr lang="en-US" dirty="0" err="1" smtClean="0"/>
+              <a:rPr lang="en-US" dirty="0" smtClean="0"/>
               <a:t>SelectKBest</a:t>
             </a:r>
             <a:endParaRPr lang="en-US" dirty="0"/>
@@ -3895,12 +4162,8 @@
           <a:p>
             <a:pPr algn="ctr"/>
             <a:r>
-              <a:rPr lang="en-US" dirty="0" err="1" smtClean="0"/>
-              <a:t>BernoulliNB</a:t>
-            </a:r>
-            <a:r>
               <a:rPr lang="en-US" dirty="0" smtClean="0"/>
-              <a:t>()</a:t>
+              <a:t>BernoulliNB()</a:t>
             </a:r>
             <a:endParaRPr lang="en-US" dirty="0"/>
           </a:p>
@@ -3944,12 +4207,8 @@
           <a:p>
             <a:pPr algn="ctr"/>
             <a:r>
-              <a:rPr lang="en-US" dirty="0" err="1" smtClean="0"/>
-              <a:t>MultinomialNB</a:t>
-            </a:r>
-            <a:r>
               <a:rPr lang="en-US" dirty="0" smtClean="0"/>
-              <a:t>()</a:t>
+              <a:t>MultinomialNB()</a:t>
             </a:r>
             <a:endParaRPr lang="en-US" dirty="0"/>
           </a:p>
@@ -3993,12 +4252,8 @@
           <a:p>
             <a:pPr algn="ctr"/>
             <a:r>
-              <a:rPr lang="en-US" dirty="0" err="1" smtClean="0"/>
-              <a:t>GaussianNB</a:t>
-            </a:r>
-            <a:r>
               <a:rPr lang="en-US" dirty="0" smtClean="0"/>
-              <a:t>()</a:t>
+              <a:t>GaussianNB()</a:t>
             </a:r>
             <a:endParaRPr lang="en-US" dirty="0"/>
           </a:p>
@@ -4042,12 +4297,8 @@
           <a:p>
             <a:pPr algn="ctr"/>
             <a:r>
-              <a:rPr lang="en-US" dirty="0" err="1" smtClean="0"/>
-              <a:t>DecisionTreeClassifier</a:t>
-            </a:r>
-            <a:r>
               <a:rPr lang="en-US" dirty="0" smtClean="0"/>
-              <a:t>()</a:t>
+              <a:t>DecisionTreeClassifier()</a:t>
             </a:r>
             <a:endParaRPr lang="en-US" dirty="0"/>
           </a:p>
@@ -4136,12 +4387,8 @@
           <a:p>
             <a:pPr algn="ctr"/>
             <a:r>
-              <a:rPr lang="en-US" dirty="0" err="1" smtClean="0"/>
-              <a:t>LinearSVC</a:t>
-            </a:r>
-            <a:r>
               <a:rPr lang="en-US" dirty="0" smtClean="0"/>
-              <a:t>()</a:t>
+              <a:t>LinearSVC()</a:t>
             </a:r>
             <a:endParaRPr lang="en-US" dirty="0"/>
           </a:p>
@@ -4183,15 +4430,7 @@
             <a:pPr algn="ctr"/>
             <a:r>
               <a:rPr lang="en-US" dirty="0" smtClean="0"/>
-              <a:t>Cross-validation (</a:t>
-            </a:r>
-            <a:r>
-              <a:rPr lang="en-US" dirty="0" err="1" smtClean="0"/>
-              <a:t>StratifiedShuffleSplit</a:t>
-            </a:r>
-            <a:r>
-              <a:rPr lang="en-US" dirty="0" smtClean="0"/>
-              <a:t>)</a:t>
+              <a:t>Cross-validation (StratifiedShuffleSplit)</a:t>
             </a:r>
             <a:endParaRPr lang="en-US" dirty="0"/>
           </a:p>
@@ -4233,15 +4472,7 @@
             <a:pPr algn="ctr"/>
             <a:r>
               <a:rPr lang="en-US" dirty="0" smtClean="0"/>
-              <a:t>Tuning parameters (</a:t>
-            </a:r>
-            <a:r>
-              <a:rPr lang="en-US" dirty="0" err="1" smtClean="0"/>
-              <a:t>GridSearchCV</a:t>
-            </a:r>
-            <a:r>
-              <a:rPr lang="en-US" dirty="0" smtClean="0"/>
-              <a:t>)</a:t>
+              <a:t>Tuning parameters (GridSearchCV)</a:t>
             </a:r>
           </a:p>
         </p:txBody>
@@ -4284,12 +4515,8 @@
           <a:p>
             <a:pPr algn="ctr"/>
             <a:r>
-              <a:rPr lang="en-US" dirty="0" err="1" smtClean="0"/>
-              <a:t>LogisticRegression</a:t>
-            </a:r>
-            <a:r>
               <a:rPr lang="en-US" dirty="0" smtClean="0"/>
-              <a:t>()</a:t>
+              <a:t>LogisticRegression()</a:t>
             </a:r>
             <a:endParaRPr lang="en-US" dirty="0"/>
           </a:p>
@@ -4333,12 +4560,8 @@
           <a:p>
             <a:pPr algn="ctr"/>
             <a:r>
-              <a:rPr lang="en-US" dirty="0" err="1" smtClean="0"/>
-              <a:t>SGDClassifier</a:t>
-            </a:r>
-            <a:r>
               <a:rPr lang="en-US" dirty="0" smtClean="0"/>
-              <a:t>()</a:t>
+              <a:t>SGDClassifier()</a:t>
             </a:r>
             <a:endParaRPr lang="en-US" dirty="0"/>
           </a:p>
@@ -4382,12 +4605,8 @@
           <a:p>
             <a:pPr algn="ctr"/>
             <a:r>
-              <a:rPr lang="en-US" dirty="0" err="1" smtClean="0"/>
-              <a:t>RidgeClassifier</a:t>
-            </a:r>
-            <a:r>
               <a:rPr lang="en-US" dirty="0" smtClean="0"/>
-              <a:t>()</a:t>
+              <a:t>RidgeClassifier()</a:t>
             </a:r>
             <a:endParaRPr lang="en-US" dirty="0"/>
           </a:p>

</xml_diff>